<commit_message>
update dokumen capstone docx dan ppt
</commit_message>
<xml_diff>
--- a/dokumen/ppt_csd40.pptx
+++ b/dokumen/ppt_csd40.pptx
@@ -11,7 +11,9 @@
     <p:sldId id="258" r:id="rId5"/>
     <p:sldId id="260" r:id="rId6"/>
     <p:sldId id="261" r:id="rId7"/>
-    <p:sldId id="262" r:id="rId8"/>
+    <p:sldId id="264" r:id="rId8"/>
+    <p:sldId id="265" r:id="rId9"/>
+    <p:sldId id="262" r:id="rId10"/>
   </p:sldIdLst>
   <p:sldSz cx="12192000" cy="6858000"/>
   <p:notesSz cx="6858000" cy="9144000"/>
@@ -267,7 +269,7 @@
           <a:p>
             <a:fld id="{FE276FF3-D8AB-43B2-AE1A-D3BDBB7D4745}" type="datetimeFigureOut">
               <a:rPr lang="en-ID" smtClean="0"/>
-              <a:t>22/12/2021</a:t>
+              <a:t>23/12/2021</a:t>
             </a:fld>
             <a:endParaRPr lang="en-ID"/>
           </a:p>
@@ -467,7 +469,7 @@
           <a:p>
             <a:fld id="{FE276FF3-D8AB-43B2-AE1A-D3BDBB7D4745}" type="datetimeFigureOut">
               <a:rPr lang="en-ID" smtClean="0"/>
-              <a:t>22/12/2021</a:t>
+              <a:t>23/12/2021</a:t>
             </a:fld>
             <a:endParaRPr lang="en-ID"/>
           </a:p>
@@ -677,7 +679,7 @@
           <a:p>
             <a:fld id="{FE276FF3-D8AB-43B2-AE1A-D3BDBB7D4745}" type="datetimeFigureOut">
               <a:rPr lang="en-ID" smtClean="0"/>
-              <a:t>22/12/2021</a:t>
+              <a:t>23/12/2021</a:t>
             </a:fld>
             <a:endParaRPr lang="en-ID"/>
           </a:p>
@@ -877,7 +879,7 @@
           <a:p>
             <a:fld id="{FE276FF3-D8AB-43B2-AE1A-D3BDBB7D4745}" type="datetimeFigureOut">
               <a:rPr lang="en-ID" smtClean="0"/>
-              <a:t>22/12/2021</a:t>
+              <a:t>23/12/2021</a:t>
             </a:fld>
             <a:endParaRPr lang="en-ID"/>
           </a:p>
@@ -1153,7 +1155,7 @@
           <a:p>
             <a:fld id="{FE276FF3-D8AB-43B2-AE1A-D3BDBB7D4745}" type="datetimeFigureOut">
               <a:rPr lang="en-ID" smtClean="0"/>
-              <a:t>22/12/2021</a:t>
+              <a:t>23/12/2021</a:t>
             </a:fld>
             <a:endParaRPr lang="en-ID"/>
           </a:p>
@@ -1421,7 +1423,7 @@
           <a:p>
             <a:fld id="{FE276FF3-D8AB-43B2-AE1A-D3BDBB7D4745}" type="datetimeFigureOut">
               <a:rPr lang="en-ID" smtClean="0"/>
-              <a:t>22/12/2021</a:t>
+              <a:t>23/12/2021</a:t>
             </a:fld>
             <a:endParaRPr lang="en-ID"/>
           </a:p>
@@ -1836,7 +1838,7 @@
           <a:p>
             <a:fld id="{FE276FF3-D8AB-43B2-AE1A-D3BDBB7D4745}" type="datetimeFigureOut">
               <a:rPr lang="en-ID" smtClean="0"/>
-              <a:t>22/12/2021</a:t>
+              <a:t>23/12/2021</a:t>
             </a:fld>
             <a:endParaRPr lang="en-ID"/>
           </a:p>
@@ -1978,7 +1980,7 @@
           <a:p>
             <a:fld id="{FE276FF3-D8AB-43B2-AE1A-D3BDBB7D4745}" type="datetimeFigureOut">
               <a:rPr lang="en-ID" smtClean="0"/>
-              <a:t>22/12/2021</a:t>
+              <a:t>23/12/2021</a:t>
             </a:fld>
             <a:endParaRPr lang="en-ID"/>
           </a:p>
@@ -2091,7 +2093,7 @@
           <a:p>
             <a:fld id="{FE276FF3-D8AB-43B2-AE1A-D3BDBB7D4745}" type="datetimeFigureOut">
               <a:rPr lang="en-ID" smtClean="0"/>
-              <a:t>22/12/2021</a:t>
+              <a:t>23/12/2021</a:t>
             </a:fld>
             <a:endParaRPr lang="en-ID"/>
           </a:p>
@@ -2404,7 +2406,7 @@
           <a:p>
             <a:fld id="{FE276FF3-D8AB-43B2-AE1A-D3BDBB7D4745}" type="datetimeFigureOut">
               <a:rPr lang="en-ID" smtClean="0"/>
-              <a:t>22/12/2021</a:t>
+              <a:t>23/12/2021</a:t>
             </a:fld>
             <a:endParaRPr lang="en-ID"/>
           </a:p>
@@ -2693,7 +2695,7 @@
           <a:p>
             <a:fld id="{FE276FF3-D8AB-43B2-AE1A-D3BDBB7D4745}" type="datetimeFigureOut">
               <a:rPr lang="en-ID" smtClean="0"/>
-              <a:t>22/12/2021</a:t>
+              <a:t>23/12/2021</a:t>
             </a:fld>
             <a:endParaRPr lang="en-ID"/>
           </a:p>
@@ -2936,7 +2938,7 @@
           <a:p>
             <a:fld id="{FE276FF3-D8AB-43B2-AE1A-D3BDBB7D4745}" type="datetimeFigureOut">
               <a:rPr lang="en-ID" smtClean="0"/>
-              <a:t>22/12/2021</a:t>
+              <a:t>23/12/2021</a:t>
             </a:fld>
             <a:endParaRPr lang="en-ID"/>
           </a:p>
@@ -6371,6 +6373,1035 @@
 </file>
 
 <file path=ppt/slides/slide7.xml><?xml version="1.0" encoding="utf-8"?>
+<p:sld xmlns:a="http://schemas.openxmlformats.org/drawingml/2006/main" xmlns:r="http://schemas.openxmlformats.org/officeDocument/2006/relationships" xmlns:p="http://schemas.openxmlformats.org/presentationml/2006/main">
+  <p:cSld>
+    <p:spTree>
+      <p:nvGrpSpPr>
+        <p:cNvPr id="1" name=""/>
+        <p:cNvGrpSpPr/>
+        <p:nvPr/>
+      </p:nvGrpSpPr>
+      <p:grpSpPr>
+        <a:xfrm>
+          <a:off x="0" y="0"/>
+          <a:ext cx="0" cy="0"/>
+          <a:chOff x="0" y="0"/>
+          <a:chExt cx="0" cy="0"/>
+        </a:xfrm>
+      </p:grpSpPr>
+      <p:sp>
+        <p:nvSpPr>
+          <p:cNvPr id="4" name="Title 3">
+            <a:extLst>
+              <a:ext uri="{FF2B5EF4-FFF2-40B4-BE49-F238E27FC236}">
+                <a16:creationId xmlns:a16="http://schemas.microsoft.com/office/drawing/2014/main" id="{B86B5304-236F-4316-834A-F8D9E0BD0DFF}"/>
+              </a:ext>
+            </a:extLst>
+          </p:cNvPr>
+          <p:cNvSpPr txBox="1">
+            <a:spLocks/>
+          </p:cNvSpPr>
+          <p:nvPr/>
+        </p:nvSpPr>
+        <p:spPr>
+          <a:xfrm>
+            <a:off x="2426748" y="749139"/>
+            <a:ext cx="7713306" cy="911710"/>
+          </a:xfrm>
+          <a:prstGeom prst="rect">
+            <a:avLst/>
+          </a:prstGeom>
+          <a:ln>
+            <a:noFill/>
+          </a:ln>
+        </p:spPr>
+        <p:txBody>
+          <a:bodyPr>
+            <a:normAutofit fontScale="85000" lnSpcReduction="10000"/>
+          </a:bodyPr>
+          <a:lstStyle>
+            <a:lvl1pPr algn="l" defTabSz="914400" rtl="0" eaLnBrk="1" latinLnBrk="0" hangingPunct="1">
+              <a:lnSpc>
+                <a:spcPct val="90000"/>
+              </a:lnSpc>
+              <a:spcBef>
+                <a:spcPct val="0"/>
+              </a:spcBef>
+              <a:buNone/>
+              <a:defRPr sz="4400" kern="1200">
+                <a:solidFill>
+                  <a:schemeClr val="tx1"/>
+                </a:solidFill>
+                <a:latin typeface="+mj-lt"/>
+                <a:ea typeface="+mj-ea"/>
+                <a:cs typeface="+mj-cs"/>
+              </a:defRPr>
+            </a:lvl1pPr>
+          </a:lstStyle>
+          <a:p>
+            <a:r>
+              <a:rPr lang="en-US" sz="5000" i="1" dirty="0">
+                <a:solidFill>
+                  <a:srgbClr val="5CA0CA"/>
+                </a:solidFill>
+                <a:latin typeface="Arial Rounded MT Bold" panose="020F0704030504030204" pitchFamily="34" charset="0"/>
+              </a:rPr>
+              <a:t>Library</a:t>
+            </a:r>
+            <a:r>
+              <a:rPr lang="en-US" sz="5000" dirty="0">
+                <a:solidFill>
+                  <a:srgbClr val="5CA0CA"/>
+                </a:solidFill>
+                <a:latin typeface="Arial Rounded MT Bold" panose="020F0704030504030204" pitchFamily="34" charset="0"/>
+              </a:rPr>
+              <a:t> yang kami </a:t>
+            </a:r>
+            <a:r>
+              <a:rPr lang="en-US" sz="5000" dirty="0" err="1">
+                <a:solidFill>
+                  <a:srgbClr val="5CA0CA"/>
+                </a:solidFill>
+                <a:latin typeface="Arial Rounded MT Bold" panose="020F0704030504030204" pitchFamily="34" charset="0"/>
+              </a:rPr>
+              <a:t>gunakan</a:t>
+            </a:r>
+            <a:endParaRPr lang="en-ID" sz="5000" i="1" dirty="0">
+              <a:solidFill>
+                <a:srgbClr val="FF0000"/>
+              </a:solidFill>
+              <a:latin typeface="Arial Rounded MT Bold" panose="020F0704030504030204" pitchFamily="34" charset="0"/>
+            </a:endParaRPr>
+          </a:p>
+        </p:txBody>
+      </p:sp>
+      <p:sp>
+        <p:nvSpPr>
+          <p:cNvPr id="8" name="TextBox 7">
+            <a:extLst>
+              <a:ext uri="{FF2B5EF4-FFF2-40B4-BE49-F238E27FC236}">
+                <a16:creationId xmlns:a16="http://schemas.microsoft.com/office/drawing/2014/main" id="{6745FEC0-141D-47CF-AA71-B8BB6D3FCD1D}"/>
+              </a:ext>
+            </a:extLst>
+          </p:cNvPr>
+          <p:cNvSpPr txBox="1"/>
+          <p:nvPr/>
+        </p:nvSpPr>
+        <p:spPr>
+          <a:xfrm>
+            <a:off x="2051574" y="1430385"/>
+            <a:ext cx="8463654" cy="4818435"/>
+          </a:xfrm>
+          <a:prstGeom prst="rect">
+            <a:avLst/>
+          </a:prstGeom>
+          <a:noFill/>
+        </p:spPr>
+        <p:txBody>
+          <a:bodyPr wrap="square" rtlCol="0">
+            <a:spAutoFit/>
+          </a:bodyPr>
+          <a:lstStyle/>
+          <a:p>
+            <a:pPr marL="228600">
+              <a:lnSpc>
+                <a:spcPct val="150000"/>
+              </a:lnSpc>
+              <a:spcAft>
+                <a:spcPts val="800"/>
+              </a:spcAft>
+            </a:pPr>
+            <a:r>
+              <a:rPr lang="id-ID" sz="1800" dirty="0">
+                <a:effectLst/>
+                <a:latin typeface="Times New Roman" panose="02020603050405020304" pitchFamily="18" charset="0"/>
+                <a:ea typeface="Calibri" panose="020F0502020204030204" pitchFamily="34" charset="0"/>
+                <a:cs typeface="Times New Roman" panose="02020603050405020304" pitchFamily="18" charset="0"/>
+              </a:rPr>
+              <a:t>1. </a:t>
+            </a:r>
+            <a:r>
+              <a:rPr lang="id-ID" sz="1800" b="1" dirty="0">
+                <a:effectLst/>
+                <a:latin typeface="Times New Roman" panose="02020603050405020304" pitchFamily="18" charset="0"/>
+                <a:ea typeface="Calibri" panose="020F0502020204030204" pitchFamily="34" charset="0"/>
+                <a:cs typeface="Times New Roman" panose="02020603050405020304" pitchFamily="18" charset="0"/>
+              </a:rPr>
+              <a:t>Circle image </a:t>
+            </a:r>
+            <a:r>
+              <a:rPr lang="id-ID" sz="1800" dirty="0">
+                <a:effectLst/>
+                <a:latin typeface="Times New Roman" panose="02020603050405020304" pitchFamily="18" charset="0"/>
+                <a:ea typeface="Calibri" panose="020F0502020204030204" pitchFamily="34" charset="0"/>
+                <a:cs typeface="Times New Roman" panose="02020603050405020304" pitchFamily="18" charset="0"/>
+              </a:rPr>
+              <a:t>(implementation 'de.hdodenhof:circleimageview:3.1.0')</a:t>
+            </a:r>
+            <a:endParaRPr lang="en-ID" sz="1800" dirty="0">
+              <a:effectLst/>
+              <a:latin typeface="Calibri" panose="020F0502020204030204" pitchFamily="34" charset="0"/>
+              <a:ea typeface="Calibri" panose="020F0502020204030204" pitchFamily="34" charset="0"/>
+              <a:cs typeface="Times New Roman" panose="02020603050405020304" pitchFamily="18" charset="0"/>
+            </a:endParaRPr>
+          </a:p>
+          <a:p>
+            <a:pPr marL="228600">
+              <a:lnSpc>
+                <a:spcPct val="150000"/>
+              </a:lnSpc>
+              <a:spcAft>
+                <a:spcPts val="800"/>
+              </a:spcAft>
+            </a:pPr>
+            <a:r>
+              <a:rPr lang="id-ID" sz="1800" dirty="0">
+                <a:effectLst/>
+                <a:latin typeface="Times New Roman" panose="02020603050405020304" pitchFamily="18" charset="0"/>
+                <a:ea typeface="Calibri" panose="020F0502020204030204" pitchFamily="34" charset="0"/>
+                <a:cs typeface="Times New Roman" panose="02020603050405020304" pitchFamily="18" charset="0"/>
+              </a:rPr>
+              <a:t>2. </a:t>
+            </a:r>
+            <a:r>
+              <a:rPr lang="id-ID" sz="1800" b="1" dirty="0">
+                <a:effectLst/>
+                <a:latin typeface="Times New Roman" panose="02020603050405020304" pitchFamily="18" charset="0"/>
+                <a:ea typeface="Calibri" panose="020F0502020204030204" pitchFamily="34" charset="0"/>
+                <a:cs typeface="Times New Roman" panose="02020603050405020304" pitchFamily="18" charset="0"/>
+              </a:rPr>
+              <a:t>Ripple Effect Layout </a:t>
+            </a:r>
+            <a:r>
+              <a:rPr lang="id-ID" sz="1800" dirty="0">
+                <a:effectLst/>
+                <a:latin typeface="Times New Roman" panose="02020603050405020304" pitchFamily="18" charset="0"/>
+                <a:ea typeface="Calibri" panose="020F0502020204030204" pitchFamily="34" charset="0"/>
+                <a:cs typeface="Times New Roman" panose="02020603050405020304" pitchFamily="18" charset="0"/>
+              </a:rPr>
+              <a:t>(implementation 'com.skyfishjy.ripplebackground:library:1.0.1')</a:t>
+            </a:r>
+            <a:endParaRPr lang="en-ID" sz="1800" dirty="0">
+              <a:effectLst/>
+              <a:latin typeface="Calibri" panose="020F0502020204030204" pitchFamily="34" charset="0"/>
+              <a:ea typeface="Calibri" panose="020F0502020204030204" pitchFamily="34" charset="0"/>
+              <a:cs typeface="Times New Roman" panose="02020603050405020304" pitchFamily="18" charset="0"/>
+            </a:endParaRPr>
+          </a:p>
+          <a:p>
+            <a:pPr marL="228600">
+              <a:lnSpc>
+                <a:spcPct val="150000"/>
+              </a:lnSpc>
+              <a:spcAft>
+                <a:spcPts val="800"/>
+              </a:spcAft>
+            </a:pPr>
+            <a:r>
+              <a:rPr lang="id-ID" sz="1800" dirty="0">
+                <a:effectLst/>
+                <a:latin typeface="Times New Roman" panose="02020603050405020304" pitchFamily="18" charset="0"/>
+                <a:ea typeface="Calibri" panose="020F0502020204030204" pitchFamily="34" charset="0"/>
+                <a:cs typeface="Times New Roman" panose="02020603050405020304" pitchFamily="18" charset="0"/>
+              </a:rPr>
+              <a:t>3. </a:t>
+            </a:r>
+            <a:r>
+              <a:rPr lang="id-ID" sz="1800" b="1" dirty="0">
+                <a:effectLst/>
+                <a:latin typeface="Times New Roman" panose="02020603050405020304" pitchFamily="18" charset="0"/>
+                <a:ea typeface="Calibri" panose="020F0502020204030204" pitchFamily="34" charset="0"/>
+                <a:cs typeface="Times New Roman" panose="02020603050405020304" pitchFamily="18" charset="0"/>
+              </a:rPr>
+              <a:t>Picasso</a:t>
+            </a:r>
+            <a:r>
+              <a:rPr lang="id-ID" sz="1800" dirty="0">
+                <a:effectLst/>
+                <a:latin typeface="Times New Roman" panose="02020603050405020304" pitchFamily="18" charset="0"/>
+                <a:ea typeface="Calibri" panose="020F0502020204030204" pitchFamily="34" charset="0"/>
+                <a:cs typeface="Times New Roman" panose="02020603050405020304" pitchFamily="18" charset="0"/>
+              </a:rPr>
+              <a:t> (implementation 'com.squareup.picasso:picasso:2.71828')</a:t>
+            </a:r>
+            <a:endParaRPr lang="en-ID" sz="1800" dirty="0">
+              <a:effectLst/>
+              <a:latin typeface="Calibri" panose="020F0502020204030204" pitchFamily="34" charset="0"/>
+              <a:ea typeface="Calibri" panose="020F0502020204030204" pitchFamily="34" charset="0"/>
+              <a:cs typeface="Times New Roman" panose="02020603050405020304" pitchFamily="18" charset="0"/>
+            </a:endParaRPr>
+          </a:p>
+          <a:p>
+            <a:pPr marL="228600">
+              <a:lnSpc>
+                <a:spcPct val="150000"/>
+              </a:lnSpc>
+              <a:spcAft>
+                <a:spcPts val="800"/>
+              </a:spcAft>
+            </a:pPr>
+            <a:r>
+              <a:rPr lang="id-ID" sz="1800" dirty="0">
+                <a:effectLst/>
+                <a:latin typeface="Times New Roman" panose="02020603050405020304" pitchFamily="18" charset="0"/>
+                <a:ea typeface="Calibri" panose="020F0502020204030204" pitchFamily="34" charset="0"/>
+                <a:cs typeface="Times New Roman" panose="02020603050405020304" pitchFamily="18" charset="0"/>
+              </a:rPr>
+              <a:t>4. </a:t>
+            </a:r>
+            <a:r>
+              <a:rPr lang="id-ID" sz="1800" b="1" dirty="0">
+                <a:effectLst/>
+                <a:latin typeface="Times New Roman" panose="02020603050405020304" pitchFamily="18" charset="0"/>
+                <a:ea typeface="Calibri" panose="020F0502020204030204" pitchFamily="34" charset="0"/>
+                <a:cs typeface="Times New Roman" panose="02020603050405020304" pitchFamily="18" charset="0"/>
+              </a:rPr>
+              <a:t>gooogle gms </a:t>
+            </a:r>
+            <a:r>
+              <a:rPr lang="id-ID" sz="1800" dirty="0">
+                <a:effectLst/>
+                <a:latin typeface="Times New Roman" panose="02020603050405020304" pitchFamily="18" charset="0"/>
+                <a:ea typeface="Calibri" panose="020F0502020204030204" pitchFamily="34" charset="0"/>
+                <a:cs typeface="Times New Roman" panose="02020603050405020304" pitchFamily="18" charset="0"/>
+              </a:rPr>
+              <a:t>(implementation 'com.google.android.gms:play-services-location:18.0.0')</a:t>
+            </a:r>
+            <a:endParaRPr lang="en-ID" sz="1800" dirty="0">
+              <a:effectLst/>
+              <a:latin typeface="Calibri" panose="020F0502020204030204" pitchFamily="34" charset="0"/>
+              <a:ea typeface="Calibri" panose="020F0502020204030204" pitchFamily="34" charset="0"/>
+              <a:cs typeface="Times New Roman" panose="02020603050405020304" pitchFamily="18" charset="0"/>
+            </a:endParaRPr>
+          </a:p>
+          <a:p>
+            <a:pPr marL="228600">
+              <a:lnSpc>
+                <a:spcPct val="150000"/>
+              </a:lnSpc>
+              <a:spcAft>
+                <a:spcPts val="800"/>
+              </a:spcAft>
+            </a:pPr>
+            <a:r>
+              <a:rPr lang="id-ID" sz="1800" dirty="0">
+                <a:effectLst/>
+                <a:latin typeface="Times New Roman" panose="02020603050405020304" pitchFamily="18" charset="0"/>
+                <a:ea typeface="Calibri" panose="020F0502020204030204" pitchFamily="34" charset="0"/>
+                <a:cs typeface="Times New Roman" panose="02020603050405020304" pitchFamily="18" charset="0"/>
+              </a:rPr>
+              <a:t>5. </a:t>
+            </a:r>
+            <a:r>
+              <a:rPr lang="id-ID" sz="1800" b="1" dirty="0">
+                <a:effectLst/>
+                <a:latin typeface="Times New Roman" panose="02020603050405020304" pitchFamily="18" charset="0"/>
+                <a:ea typeface="Calibri" panose="020F0502020204030204" pitchFamily="34" charset="0"/>
+                <a:cs typeface="Times New Roman" panose="02020603050405020304" pitchFamily="18" charset="0"/>
+              </a:rPr>
+              <a:t>Motion Tost</a:t>
+            </a:r>
+            <a:r>
+              <a:rPr lang="id-ID" sz="1800" dirty="0">
+                <a:effectLst/>
+                <a:latin typeface="Times New Roman" panose="02020603050405020304" pitchFamily="18" charset="0"/>
+                <a:ea typeface="Calibri" panose="020F0502020204030204" pitchFamily="34" charset="0"/>
+                <a:cs typeface="Times New Roman" panose="02020603050405020304" pitchFamily="18" charset="0"/>
+              </a:rPr>
+              <a:t> (implementation 'com.github.Spikeysanju:MotionToast:1.4')</a:t>
+            </a:r>
+            <a:endParaRPr lang="en-ID" sz="1800" dirty="0">
+              <a:effectLst/>
+              <a:latin typeface="Calibri" panose="020F0502020204030204" pitchFamily="34" charset="0"/>
+              <a:ea typeface="Calibri" panose="020F0502020204030204" pitchFamily="34" charset="0"/>
+              <a:cs typeface="Times New Roman" panose="02020603050405020304" pitchFamily="18" charset="0"/>
+            </a:endParaRPr>
+          </a:p>
+          <a:p>
+            <a:pPr marL="228600">
+              <a:lnSpc>
+                <a:spcPct val="150000"/>
+              </a:lnSpc>
+              <a:spcAft>
+                <a:spcPts val="800"/>
+              </a:spcAft>
+            </a:pPr>
+            <a:r>
+              <a:rPr lang="id-ID" sz="1800" dirty="0">
+                <a:effectLst/>
+                <a:latin typeface="Times New Roman" panose="02020603050405020304" pitchFamily="18" charset="0"/>
+                <a:ea typeface="Calibri" panose="020F0502020204030204" pitchFamily="34" charset="0"/>
+                <a:cs typeface="Times New Roman" panose="02020603050405020304" pitchFamily="18" charset="0"/>
+              </a:rPr>
+              <a:t>6. </a:t>
+            </a:r>
+            <a:r>
+              <a:rPr lang="id-ID" sz="1800" b="1" dirty="0">
+                <a:effectLst/>
+                <a:latin typeface="Times New Roman" panose="02020603050405020304" pitchFamily="18" charset="0"/>
+                <a:ea typeface="Calibri" panose="020F0502020204030204" pitchFamily="34" charset="0"/>
+                <a:cs typeface="Times New Roman" panose="02020603050405020304" pitchFamily="18" charset="0"/>
+              </a:rPr>
+              <a:t>Lottie Animation </a:t>
+            </a:r>
+            <a:r>
+              <a:rPr lang="id-ID" sz="1800" dirty="0">
+                <a:effectLst/>
+                <a:latin typeface="Times New Roman" panose="02020603050405020304" pitchFamily="18" charset="0"/>
+                <a:ea typeface="Calibri" panose="020F0502020204030204" pitchFamily="34" charset="0"/>
+                <a:cs typeface="Times New Roman" panose="02020603050405020304" pitchFamily="18" charset="0"/>
+              </a:rPr>
+              <a:t>(def lottieVersion = "3.4.0" implementation "com.airbnb.android:lottie:$lottieVersion")</a:t>
+            </a:r>
+            <a:endParaRPr lang="en-ID" sz="1800" dirty="0">
+              <a:effectLst/>
+              <a:latin typeface="Calibri" panose="020F0502020204030204" pitchFamily="34" charset="0"/>
+              <a:ea typeface="Calibri" panose="020F0502020204030204" pitchFamily="34" charset="0"/>
+              <a:cs typeface="Times New Roman" panose="02020603050405020304" pitchFamily="18" charset="0"/>
+            </a:endParaRPr>
+          </a:p>
+          <a:p>
+            <a:pPr marL="228600">
+              <a:lnSpc>
+                <a:spcPct val="150000"/>
+              </a:lnSpc>
+              <a:spcAft>
+                <a:spcPts val="800"/>
+              </a:spcAft>
+            </a:pPr>
+            <a:r>
+              <a:rPr lang="id-ID" sz="1800" dirty="0">
+                <a:effectLst/>
+                <a:latin typeface="Times New Roman" panose="02020603050405020304" pitchFamily="18" charset="0"/>
+                <a:ea typeface="Calibri" panose="020F0502020204030204" pitchFamily="34" charset="0"/>
+                <a:cs typeface="Times New Roman" panose="02020603050405020304" pitchFamily="18" charset="0"/>
+              </a:rPr>
+              <a:t>7. </a:t>
+            </a:r>
+            <a:r>
+              <a:rPr lang="id-ID" sz="1800" b="1" dirty="0">
+                <a:effectLst/>
+                <a:latin typeface="Times New Roman" panose="02020603050405020304" pitchFamily="18" charset="0"/>
+                <a:ea typeface="Calibri" panose="020F0502020204030204" pitchFamily="34" charset="0"/>
+                <a:cs typeface="Times New Roman" panose="02020603050405020304" pitchFamily="18" charset="0"/>
+              </a:rPr>
+              <a:t>Wave animations</a:t>
+            </a:r>
+            <a:r>
+              <a:rPr lang="id-ID" sz="1800" dirty="0">
+                <a:effectLst/>
+                <a:latin typeface="Times New Roman" panose="02020603050405020304" pitchFamily="18" charset="0"/>
+                <a:ea typeface="Calibri" panose="020F0502020204030204" pitchFamily="34" charset="0"/>
+                <a:cs typeface="Times New Roman" panose="02020603050405020304" pitchFamily="18" charset="0"/>
+              </a:rPr>
+              <a:t> (implementation "com.scwang.wave:MultiWaveHeader:1.0.0")</a:t>
+            </a:r>
+            <a:endParaRPr lang="en-ID" sz="1800" dirty="0">
+              <a:effectLst/>
+              <a:latin typeface="Calibri" panose="020F0502020204030204" pitchFamily="34" charset="0"/>
+              <a:ea typeface="Calibri" panose="020F0502020204030204" pitchFamily="34" charset="0"/>
+              <a:cs typeface="Times New Roman" panose="02020603050405020304" pitchFamily="18" charset="0"/>
+            </a:endParaRPr>
+          </a:p>
+        </p:txBody>
+      </p:sp>
+    </p:spTree>
+    <p:extLst>
+      <p:ext uri="{BB962C8B-B14F-4D97-AF65-F5344CB8AC3E}">
+        <p14:creationId xmlns:p14="http://schemas.microsoft.com/office/powerpoint/2010/main" val="322334192"/>
+      </p:ext>
+    </p:extLst>
+  </p:cSld>
+  <p:clrMapOvr>
+    <a:masterClrMapping/>
+  </p:clrMapOvr>
+  <mc:AlternateContent xmlns:mc="http://schemas.openxmlformats.org/markup-compatibility/2006" xmlns:p159="http://schemas.microsoft.com/office/powerpoint/2015/09/main">
+    <mc:Choice Requires="p159">
+      <p:transition xmlns:p14="http://schemas.microsoft.com/office/powerpoint/2010/main" spd="slow" p14:dur="2000">
+        <p159:morph option="byObject"/>
+      </p:transition>
+    </mc:Choice>
+    <mc:Fallback xmlns="">
+      <p:transition spd="slow">
+        <p:fade/>
+      </p:transition>
+    </mc:Fallback>
+  </mc:AlternateContent>
+</p:sld>
+</file>
+
+<file path=ppt/slides/slide8.xml><?xml version="1.0" encoding="utf-8"?>
+<p:sld xmlns:a="http://schemas.openxmlformats.org/drawingml/2006/main" xmlns:r="http://schemas.openxmlformats.org/officeDocument/2006/relationships" xmlns:p="http://schemas.openxmlformats.org/presentationml/2006/main">
+  <p:cSld>
+    <p:spTree>
+      <p:nvGrpSpPr>
+        <p:cNvPr id="1" name=""/>
+        <p:cNvGrpSpPr/>
+        <p:nvPr/>
+      </p:nvGrpSpPr>
+      <p:grpSpPr>
+        <a:xfrm>
+          <a:off x="0" y="0"/>
+          <a:ext cx="0" cy="0"/>
+          <a:chOff x="0" y="0"/>
+          <a:chExt cx="0" cy="0"/>
+        </a:xfrm>
+      </p:grpSpPr>
+      <p:sp>
+        <p:nvSpPr>
+          <p:cNvPr id="4" name="Title 3">
+            <a:extLst>
+              <a:ext uri="{FF2B5EF4-FFF2-40B4-BE49-F238E27FC236}">
+                <a16:creationId xmlns:a16="http://schemas.microsoft.com/office/drawing/2014/main" id="{B86B5304-236F-4316-834A-F8D9E0BD0DFF}"/>
+              </a:ext>
+            </a:extLst>
+          </p:cNvPr>
+          <p:cNvSpPr txBox="1">
+            <a:spLocks/>
+          </p:cNvSpPr>
+          <p:nvPr/>
+        </p:nvSpPr>
+        <p:spPr>
+          <a:xfrm>
+            <a:off x="2426748" y="749139"/>
+            <a:ext cx="7713306" cy="911710"/>
+          </a:xfrm>
+          <a:prstGeom prst="rect">
+            <a:avLst/>
+          </a:prstGeom>
+          <a:ln>
+            <a:noFill/>
+          </a:ln>
+        </p:spPr>
+        <p:txBody>
+          <a:bodyPr>
+            <a:normAutofit fontScale="85000" lnSpcReduction="10000"/>
+          </a:bodyPr>
+          <a:lstStyle>
+            <a:lvl1pPr algn="l" defTabSz="914400" rtl="0" eaLnBrk="1" latinLnBrk="0" hangingPunct="1">
+              <a:lnSpc>
+                <a:spcPct val="90000"/>
+              </a:lnSpc>
+              <a:spcBef>
+                <a:spcPct val="0"/>
+              </a:spcBef>
+              <a:buNone/>
+              <a:defRPr sz="4400" kern="1200">
+                <a:solidFill>
+                  <a:schemeClr val="tx1"/>
+                </a:solidFill>
+                <a:latin typeface="+mj-lt"/>
+                <a:ea typeface="+mj-ea"/>
+                <a:cs typeface="+mj-cs"/>
+              </a:defRPr>
+            </a:lvl1pPr>
+          </a:lstStyle>
+          <a:p>
+            <a:r>
+              <a:rPr lang="en-US" sz="5000" i="1" dirty="0">
+                <a:solidFill>
+                  <a:srgbClr val="5CA0CA"/>
+                </a:solidFill>
+                <a:latin typeface="Arial Rounded MT Bold" panose="020F0704030504030204" pitchFamily="34" charset="0"/>
+              </a:rPr>
+              <a:t>Dataset</a:t>
+            </a:r>
+            <a:r>
+              <a:rPr lang="en-US" sz="5000" dirty="0">
+                <a:solidFill>
+                  <a:srgbClr val="5CA0CA"/>
+                </a:solidFill>
+                <a:latin typeface="Arial Rounded MT Bold" panose="020F0704030504030204" pitchFamily="34" charset="0"/>
+              </a:rPr>
+              <a:t> yang kami </a:t>
+            </a:r>
+            <a:r>
+              <a:rPr lang="en-US" sz="5000" dirty="0" err="1">
+                <a:solidFill>
+                  <a:srgbClr val="5CA0CA"/>
+                </a:solidFill>
+                <a:latin typeface="Arial Rounded MT Bold" panose="020F0704030504030204" pitchFamily="34" charset="0"/>
+              </a:rPr>
+              <a:t>gunakan</a:t>
+            </a:r>
+            <a:endParaRPr lang="en-ID" sz="5000" i="1" dirty="0">
+              <a:solidFill>
+                <a:srgbClr val="FF0000"/>
+              </a:solidFill>
+              <a:latin typeface="Arial Rounded MT Bold" panose="020F0704030504030204" pitchFamily="34" charset="0"/>
+            </a:endParaRPr>
+          </a:p>
+        </p:txBody>
+      </p:sp>
+      <p:sp>
+        <p:nvSpPr>
+          <p:cNvPr id="8" name="TextBox 7">
+            <a:extLst>
+              <a:ext uri="{FF2B5EF4-FFF2-40B4-BE49-F238E27FC236}">
+                <a16:creationId xmlns:a16="http://schemas.microsoft.com/office/drawing/2014/main" id="{6745FEC0-141D-47CF-AA71-B8BB6D3FCD1D}"/>
+              </a:ext>
+            </a:extLst>
+          </p:cNvPr>
+          <p:cNvSpPr txBox="1"/>
+          <p:nvPr/>
+        </p:nvSpPr>
+        <p:spPr>
+          <a:xfrm>
+            <a:off x="2051574" y="1430385"/>
+            <a:ext cx="8463654" cy="2332049"/>
+          </a:xfrm>
+          <a:prstGeom prst="rect">
+            <a:avLst/>
+          </a:prstGeom>
+          <a:noFill/>
+        </p:spPr>
+        <p:txBody>
+          <a:bodyPr wrap="square" rtlCol="0">
+            <a:spAutoFit/>
+          </a:bodyPr>
+          <a:lstStyle/>
+          <a:p>
+            <a:pPr marL="571500" indent="-342900">
+              <a:lnSpc>
+                <a:spcPct val="150000"/>
+              </a:lnSpc>
+              <a:spcAft>
+                <a:spcPts val="800"/>
+              </a:spcAft>
+              <a:buAutoNum type="arabicPeriod"/>
+            </a:pPr>
+            <a:r>
+              <a:rPr lang="en-US" sz="1800" b="1" dirty="0">
+                <a:solidFill>
+                  <a:srgbClr val="000000"/>
+                </a:solidFill>
+                <a:effectLst/>
+                <a:latin typeface="Times New Roman" panose="02020603050405020304" pitchFamily="18" charset="0"/>
+                <a:ea typeface="Times New Roman" panose="02020603050405020304" pitchFamily="18" charset="0"/>
+                <a:cs typeface="Times New Roman" panose="02020603050405020304" pitchFamily="18" charset="0"/>
+              </a:rPr>
+              <a:t>Logo </a:t>
+            </a:r>
+            <a:r>
+              <a:rPr lang="en-US" sz="1800" b="1" dirty="0" err="1">
+                <a:solidFill>
+                  <a:srgbClr val="000000"/>
+                </a:solidFill>
+                <a:effectLst/>
+                <a:latin typeface="Times New Roman" panose="02020603050405020304" pitchFamily="18" charset="0"/>
+                <a:ea typeface="Times New Roman" panose="02020603050405020304" pitchFamily="18" charset="0"/>
+                <a:cs typeface="Times New Roman" panose="02020603050405020304" pitchFamily="18" charset="0"/>
+              </a:rPr>
+              <a:t>kabupaten</a:t>
+            </a:r>
+            <a:r>
+              <a:rPr lang="en-US" sz="1800" b="1" dirty="0">
+                <a:solidFill>
+                  <a:srgbClr val="000000"/>
+                </a:solidFill>
+                <a:effectLst/>
+                <a:latin typeface="Times New Roman" panose="02020603050405020304" pitchFamily="18" charset="0"/>
+                <a:ea typeface="Times New Roman" panose="02020603050405020304" pitchFamily="18" charset="0"/>
+                <a:cs typeface="Times New Roman" panose="02020603050405020304" pitchFamily="18" charset="0"/>
+              </a:rPr>
+              <a:t> </a:t>
+            </a:r>
+            <a:r>
+              <a:rPr lang="en-US" sz="1800" b="1" dirty="0" err="1">
+                <a:solidFill>
+                  <a:srgbClr val="000000"/>
+                </a:solidFill>
+                <a:effectLst/>
+                <a:latin typeface="Times New Roman" panose="02020603050405020304" pitchFamily="18" charset="0"/>
+                <a:ea typeface="Times New Roman" panose="02020603050405020304" pitchFamily="18" charset="0"/>
+                <a:cs typeface="Times New Roman" panose="02020603050405020304" pitchFamily="18" charset="0"/>
+              </a:rPr>
+              <a:t>Tegal</a:t>
+            </a:r>
+            <a:r>
+              <a:rPr lang="en-US" sz="1800" dirty="0">
+                <a:solidFill>
+                  <a:srgbClr val="000000"/>
+                </a:solidFill>
+                <a:effectLst/>
+                <a:latin typeface="Times New Roman" panose="02020603050405020304" pitchFamily="18" charset="0"/>
+                <a:ea typeface="Times New Roman" panose="02020603050405020304" pitchFamily="18" charset="0"/>
+                <a:cs typeface="Times New Roman" panose="02020603050405020304" pitchFamily="18" charset="0"/>
+              </a:rPr>
+              <a:t> (</a:t>
+            </a:r>
+            <a:r>
+              <a:rPr lang="id-ID" sz="1800" u="sng" dirty="0">
+                <a:solidFill>
+                  <a:srgbClr val="0563C1"/>
+                </a:solidFill>
+                <a:effectLst/>
+                <a:latin typeface="Times New Roman" panose="02020603050405020304" pitchFamily="18" charset="0"/>
+                <a:ea typeface="Calibri" panose="020F0502020204030204" pitchFamily="34" charset="0"/>
+                <a:cs typeface="Times New Roman" panose="02020603050405020304" pitchFamily="18" charset="0"/>
+                <a:hlinkClick r:id="rId2"/>
+              </a:rPr>
+              <a:t>Logo Kabupaten Tegal (INDONESIA) Original Terbaru - rekreartive</a:t>
+            </a:r>
+            <a:r>
+              <a:rPr lang="en-US" sz="1800" dirty="0">
+                <a:solidFill>
+                  <a:srgbClr val="000000"/>
+                </a:solidFill>
+                <a:effectLst/>
+                <a:latin typeface="Times New Roman" panose="02020603050405020304" pitchFamily="18" charset="0"/>
+                <a:ea typeface="Times New Roman" panose="02020603050405020304" pitchFamily="18" charset="0"/>
+                <a:cs typeface="Times New Roman" panose="02020603050405020304" pitchFamily="18" charset="0"/>
+              </a:rPr>
+              <a:t>) (kami </a:t>
+            </a:r>
+            <a:r>
+              <a:rPr lang="en-US" sz="1800" dirty="0" err="1">
+                <a:solidFill>
+                  <a:srgbClr val="000000"/>
+                </a:solidFill>
+                <a:effectLst/>
+                <a:latin typeface="Times New Roman" panose="02020603050405020304" pitchFamily="18" charset="0"/>
+                <a:ea typeface="Times New Roman" panose="02020603050405020304" pitchFamily="18" charset="0"/>
+                <a:cs typeface="Times New Roman" panose="02020603050405020304" pitchFamily="18" charset="0"/>
+              </a:rPr>
+              <a:t>telah</a:t>
+            </a:r>
+            <a:r>
+              <a:rPr lang="en-US" sz="1800" dirty="0">
+                <a:solidFill>
+                  <a:srgbClr val="000000"/>
+                </a:solidFill>
+                <a:effectLst/>
+                <a:latin typeface="Times New Roman" panose="02020603050405020304" pitchFamily="18" charset="0"/>
+                <a:ea typeface="Times New Roman" panose="02020603050405020304" pitchFamily="18" charset="0"/>
+                <a:cs typeface="Times New Roman" panose="02020603050405020304" pitchFamily="18" charset="0"/>
+              </a:rPr>
+              <a:t> </a:t>
+            </a:r>
+            <a:r>
+              <a:rPr lang="en-US" sz="1800" dirty="0" err="1">
+                <a:solidFill>
+                  <a:srgbClr val="000000"/>
+                </a:solidFill>
+                <a:effectLst/>
+                <a:latin typeface="Times New Roman" panose="02020603050405020304" pitchFamily="18" charset="0"/>
+                <a:ea typeface="Times New Roman" panose="02020603050405020304" pitchFamily="18" charset="0"/>
+                <a:cs typeface="Times New Roman" panose="02020603050405020304" pitchFamily="18" charset="0"/>
+              </a:rPr>
+              <a:t>mendaptkan</a:t>
+            </a:r>
+            <a:r>
+              <a:rPr lang="en-US" sz="1800" dirty="0">
+                <a:solidFill>
+                  <a:srgbClr val="000000"/>
+                </a:solidFill>
+                <a:effectLst/>
+                <a:latin typeface="Times New Roman" panose="02020603050405020304" pitchFamily="18" charset="0"/>
+                <a:ea typeface="Times New Roman" panose="02020603050405020304" pitchFamily="18" charset="0"/>
+                <a:cs typeface="Times New Roman" panose="02020603050405020304" pitchFamily="18" charset="0"/>
+              </a:rPr>
+              <a:t> </a:t>
+            </a:r>
+            <a:r>
+              <a:rPr lang="en-US" sz="1800" dirty="0" err="1">
+                <a:solidFill>
+                  <a:srgbClr val="000000"/>
+                </a:solidFill>
+                <a:effectLst/>
+                <a:latin typeface="Times New Roman" panose="02020603050405020304" pitchFamily="18" charset="0"/>
+                <a:ea typeface="Times New Roman" panose="02020603050405020304" pitchFamily="18" charset="0"/>
+                <a:cs typeface="Times New Roman" panose="02020603050405020304" pitchFamily="18" charset="0"/>
+              </a:rPr>
+              <a:t>izin</a:t>
+            </a:r>
+            <a:r>
+              <a:rPr lang="en-US" sz="1800" dirty="0">
+                <a:solidFill>
+                  <a:srgbClr val="000000"/>
+                </a:solidFill>
+                <a:effectLst/>
+                <a:latin typeface="Times New Roman" panose="02020603050405020304" pitchFamily="18" charset="0"/>
+                <a:ea typeface="Times New Roman" panose="02020603050405020304" pitchFamily="18" charset="0"/>
+                <a:cs typeface="Times New Roman" panose="02020603050405020304" pitchFamily="18" charset="0"/>
+              </a:rPr>
+              <a:t> </a:t>
+            </a:r>
+            <a:r>
+              <a:rPr lang="en-US" sz="1800" dirty="0" err="1">
+                <a:solidFill>
+                  <a:srgbClr val="000000"/>
+                </a:solidFill>
+                <a:effectLst/>
+                <a:latin typeface="Times New Roman" panose="02020603050405020304" pitchFamily="18" charset="0"/>
+                <a:ea typeface="Times New Roman" panose="02020603050405020304" pitchFamily="18" charset="0"/>
+                <a:cs typeface="Times New Roman" panose="02020603050405020304" pitchFamily="18" charset="0"/>
+              </a:rPr>
+              <a:t>dari</a:t>
+            </a:r>
+            <a:r>
+              <a:rPr lang="en-US" sz="1800" dirty="0">
+                <a:solidFill>
+                  <a:srgbClr val="000000"/>
+                </a:solidFill>
+                <a:effectLst/>
+                <a:latin typeface="Times New Roman" panose="02020603050405020304" pitchFamily="18" charset="0"/>
+                <a:ea typeface="Times New Roman" panose="02020603050405020304" pitchFamily="18" charset="0"/>
+                <a:cs typeface="Times New Roman" panose="02020603050405020304" pitchFamily="18" charset="0"/>
+              </a:rPr>
+              <a:t> </a:t>
+            </a:r>
+            <a:r>
+              <a:rPr lang="en-US" sz="1800" dirty="0" err="1">
+                <a:solidFill>
+                  <a:srgbClr val="000000"/>
+                </a:solidFill>
+                <a:effectLst/>
+                <a:latin typeface="Times New Roman" panose="02020603050405020304" pitchFamily="18" charset="0"/>
+                <a:ea typeface="Times New Roman" panose="02020603050405020304" pitchFamily="18" charset="0"/>
+                <a:cs typeface="Times New Roman" panose="02020603050405020304" pitchFamily="18" charset="0"/>
+              </a:rPr>
+              <a:t>sekretariat</a:t>
+            </a:r>
+            <a:r>
+              <a:rPr lang="en-US" sz="1800" dirty="0">
+                <a:solidFill>
+                  <a:srgbClr val="000000"/>
+                </a:solidFill>
+                <a:effectLst/>
+                <a:latin typeface="Times New Roman" panose="02020603050405020304" pitchFamily="18" charset="0"/>
+                <a:ea typeface="Times New Roman" panose="02020603050405020304" pitchFamily="18" charset="0"/>
+                <a:cs typeface="Times New Roman" panose="02020603050405020304" pitchFamily="18" charset="0"/>
+              </a:rPr>
+              <a:t> </a:t>
+            </a:r>
+            <a:r>
+              <a:rPr lang="en-US" sz="1800" dirty="0" err="1">
+                <a:solidFill>
+                  <a:srgbClr val="000000"/>
+                </a:solidFill>
+                <a:effectLst/>
+                <a:latin typeface="Times New Roman" panose="02020603050405020304" pitchFamily="18" charset="0"/>
+                <a:ea typeface="Times New Roman" panose="02020603050405020304" pitchFamily="18" charset="0"/>
+                <a:cs typeface="Times New Roman" panose="02020603050405020304" pitchFamily="18" charset="0"/>
+              </a:rPr>
+              <a:t>kantor</a:t>
+            </a:r>
+            <a:r>
+              <a:rPr lang="en-US" sz="1800" dirty="0">
+                <a:solidFill>
+                  <a:srgbClr val="000000"/>
+                </a:solidFill>
+                <a:effectLst/>
+                <a:latin typeface="Times New Roman" panose="02020603050405020304" pitchFamily="18" charset="0"/>
+                <a:ea typeface="Times New Roman" panose="02020603050405020304" pitchFamily="18" charset="0"/>
+                <a:cs typeface="Times New Roman" panose="02020603050405020304" pitchFamily="18" charset="0"/>
+              </a:rPr>
+              <a:t> </a:t>
+            </a:r>
+            <a:r>
+              <a:rPr lang="en-US" sz="1800" dirty="0" err="1">
+                <a:solidFill>
+                  <a:srgbClr val="000000"/>
+                </a:solidFill>
+                <a:effectLst/>
+                <a:latin typeface="Times New Roman" panose="02020603050405020304" pitchFamily="18" charset="0"/>
+                <a:ea typeface="Times New Roman" panose="02020603050405020304" pitchFamily="18" charset="0"/>
+                <a:cs typeface="Times New Roman" panose="02020603050405020304" pitchFamily="18" charset="0"/>
+              </a:rPr>
+              <a:t>untuk</a:t>
+            </a:r>
+            <a:r>
+              <a:rPr lang="en-US" sz="1800" dirty="0">
+                <a:solidFill>
+                  <a:srgbClr val="000000"/>
+                </a:solidFill>
+                <a:effectLst/>
+                <a:latin typeface="Times New Roman" panose="02020603050405020304" pitchFamily="18" charset="0"/>
+                <a:ea typeface="Times New Roman" panose="02020603050405020304" pitchFamily="18" charset="0"/>
+                <a:cs typeface="Times New Roman" panose="02020603050405020304" pitchFamily="18" charset="0"/>
+              </a:rPr>
+              <a:t> </a:t>
+            </a:r>
+            <a:r>
+              <a:rPr lang="en-US" sz="1800" dirty="0" err="1">
+                <a:solidFill>
+                  <a:srgbClr val="000000"/>
+                </a:solidFill>
+                <a:effectLst/>
+                <a:latin typeface="Times New Roman" panose="02020603050405020304" pitchFamily="18" charset="0"/>
+                <a:ea typeface="Times New Roman" panose="02020603050405020304" pitchFamily="18" charset="0"/>
+                <a:cs typeface="Times New Roman" panose="02020603050405020304" pitchFamily="18" charset="0"/>
+              </a:rPr>
+              <a:t>mencantumkanya</a:t>
+            </a:r>
+            <a:r>
+              <a:rPr lang="en-US" sz="1800" dirty="0">
+                <a:solidFill>
+                  <a:srgbClr val="000000"/>
+                </a:solidFill>
+                <a:effectLst/>
+                <a:latin typeface="Times New Roman" panose="02020603050405020304" pitchFamily="18" charset="0"/>
+                <a:ea typeface="Times New Roman" panose="02020603050405020304" pitchFamily="18" charset="0"/>
+                <a:cs typeface="Times New Roman" panose="02020603050405020304" pitchFamily="18" charset="0"/>
+              </a:rPr>
+              <a:t> </a:t>
+            </a:r>
+            <a:r>
+              <a:rPr lang="en-US" sz="1800" dirty="0" err="1">
+                <a:solidFill>
+                  <a:srgbClr val="000000"/>
+                </a:solidFill>
+                <a:effectLst/>
+                <a:latin typeface="Times New Roman" panose="02020603050405020304" pitchFamily="18" charset="0"/>
+                <a:ea typeface="Times New Roman" panose="02020603050405020304" pitchFamily="18" charset="0"/>
+                <a:cs typeface="Times New Roman" panose="02020603050405020304" pitchFamily="18" charset="0"/>
+              </a:rPr>
+              <a:t>didalam</a:t>
+            </a:r>
+            <a:r>
+              <a:rPr lang="en-US" sz="1800" dirty="0">
+                <a:solidFill>
+                  <a:srgbClr val="000000"/>
+                </a:solidFill>
+                <a:effectLst/>
+                <a:latin typeface="Times New Roman" panose="02020603050405020304" pitchFamily="18" charset="0"/>
+                <a:ea typeface="Times New Roman" panose="02020603050405020304" pitchFamily="18" charset="0"/>
+                <a:cs typeface="Times New Roman" panose="02020603050405020304" pitchFamily="18" charset="0"/>
+              </a:rPr>
+              <a:t> </a:t>
+            </a:r>
+            <a:r>
+              <a:rPr lang="en-US" sz="1800" dirty="0" err="1">
+                <a:solidFill>
+                  <a:srgbClr val="000000"/>
+                </a:solidFill>
+                <a:effectLst/>
+                <a:latin typeface="Times New Roman" panose="02020603050405020304" pitchFamily="18" charset="0"/>
+                <a:ea typeface="Times New Roman" panose="02020603050405020304" pitchFamily="18" charset="0"/>
+                <a:cs typeface="Times New Roman" panose="02020603050405020304" pitchFamily="18" charset="0"/>
+              </a:rPr>
+              <a:t>aplikasi</a:t>
+            </a:r>
+            <a:r>
+              <a:rPr lang="en-US" sz="1800" dirty="0">
+                <a:solidFill>
+                  <a:srgbClr val="000000"/>
+                </a:solidFill>
+                <a:effectLst/>
+                <a:latin typeface="Times New Roman" panose="02020603050405020304" pitchFamily="18" charset="0"/>
+                <a:ea typeface="Times New Roman" panose="02020603050405020304" pitchFamily="18" charset="0"/>
+                <a:cs typeface="Times New Roman" panose="02020603050405020304" pitchFamily="18" charset="0"/>
+              </a:rPr>
+              <a:t> kami)</a:t>
+            </a:r>
+          </a:p>
+          <a:p>
+            <a:pPr marL="571500" indent="-342900">
+              <a:lnSpc>
+                <a:spcPct val="150000"/>
+              </a:lnSpc>
+              <a:spcAft>
+                <a:spcPts val="800"/>
+              </a:spcAft>
+              <a:buAutoNum type="arabicPeriod"/>
+            </a:pPr>
+            <a:r>
+              <a:rPr lang="en-US" b="1" dirty="0">
+                <a:solidFill>
+                  <a:srgbClr val="000000"/>
+                </a:solidFill>
+                <a:latin typeface="Times New Roman" panose="02020603050405020304" pitchFamily="18" charset="0"/>
+                <a:ea typeface="Calibri" panose="020F0502020204030204" pitchFamily="34" charset="0"/>
+                <a:cs typeface="Times New Roman" panose="02020603050405020304" pitchFamily="18" charset="0"/>
+              </a:rPr>
+              <a:t>Icon email refresh</a:t>
+            </a:r>
+            <a:r>
+              <a:rPr lang="en-US" dirty="0">
+                <a:solidFill>
+                  <a:srgbClr val="000000"/>
+                </a:solidFill>
+                <a:latin typeface="Times New Roman" panose="02020603050405020304" pitchFamily="18" charset="0"/>
+                <a:ea typeface="Calibri" panose="020F0502020204030204" pitchFamily="34" charset="0"/>
+                <a:cs typeface="Times New Roman" panose="02020603050405020304" pitchFamily="18" charset="0"/>
+              </a:rPr>
+              <a:t> (</a:t>
+            </a:r>
+            <a:r>
+              <a:rPr lang="en-US" dirty="0">
+                <a:solidFill>
+                  <a:srgbClr val="000000"/>
+                </a:solidFill>
+                <a:latin typeface="Times New Roman" panose="02020603050405020304" pitchFamily="18" charset="0"/>
+                <a:ea typeface="Calibri" panose="020F0502020204030204" pitchFamily="34" charset="0"/>
+                <a:cs typeface="Times New Roman" panose="02020603050405020304" pitchFamily="18" charset="0"/>
+                <a:hlinkClick r:id="rId3"/>
+              </a:rPr>
+              <a:t>https://icons8.com/icon/124409/refresh-mail</a:t>
+            </a:r>
+            <a:r>
+              <a:rPr lang="en-US" dirty="0">
+                <a:solidFill>
+                  <a:srgbClr val="000000"/>
+                </a:solidFill>
+                <a:latin typeface="Times New Roman" panose="02020603050405020304" pitchFamily="18" charset="0"/>
+                <a:ea typeface="Calibri" panose="020F0502020204030204" pitchFamily="34" charset="0"/>
+                <a:cs typeface="Times New Roman" panose="02020603050405020304" pitchFamily="18" charset="0"/>
+              </a:rPr>
+              <a:t>)</a:t>
+            </a:r>
+            <a:endParaRPr lang="en-ID" sz="1800" dirty="0">
+              <a:effectLst/>
+              <a:latin typeface="Calibri" panose="020F0502020204030204" pitchFamily="34" charset="0"/>
+              <a:ea typeface="Calibri" panose="020F0502020204030204" pitchFamily="34" charset="0"/>
+              <a:cs typeface="Times New Roman" panose="02020603050405020304" pitchFamily="18" charset="0"/>
+            </a:endParaRPr>
+          </a:p>
+          <a:p>
+            <a:pPr marL="228600">
+              <a:lnSpc>
+                <a:spcPct val="150000"/>
+              </a:lnSpc>
+              <a:spcAft>
+                <a:spcPts val="800"/>
+              </a:spcAft>
+            </a:pPr>
+            <a:endParaRPr lang="en-ID" sz="1800" dirty="0">
+              <a:effectLst/>
+              <a:latin typeface="Calibri" panose="020F0502020204030204" pitchFamily="34" charset="0"/>
+              <a:ea typeface="Calibri" panose="020F0502020204030204" pitchFamily="34" charset="0"/>
+              <a:cs typeface="Times New Roman" panose="02020603050405020304" pitchFamily="18" charset="0"/>
+            </a:endParaRPr>
+          </a:p>
+        </p:txBody>
+      </p:sp>
+    </p:spTree>
+    <p:extLst>
+      <p:ext uri="{BB962C8B-B14F-4D97-AF65-F5344CB8AC3E}">
+        <p14:creationId xmlns:p14="http://schemas.microsoft.com/office/powerpoint/2010/main" val="2020297008"/>
+      </p:ext>
+    </p:extLst>
+  </p:cSld>
+  <p:clrMapOvr>
+    <a:masterClrMapping/>
+  </p:clrMapOvr>
+  <mc:AlternateContent xmlns:mc="http://schemas.openxmlformats.org/markup-compatibility/2006" xmlns:p159="http://schemas.microsoft.com/office/powerpoint/2015/09/main">
+    <mc:Choice Requires="p159">
+      <p:transition xmlns:p14="http://schemas.microsoft.com/office/powerpoint/2010/main" spd="slow" p14:dur="2000">
+        <p159:morph option="byObject"/>
+      </p:transition>
+    </mc:Choice>
+    <mc:Fallback xmlns="">
+      <p:transition spd="slow">
+        <p:fade/>
+      </p:transition>
+    </mc:Fallback>
+  </mc:AlternateContent>
+</p:sld>
+</file>
+
+<file path=ppt/slides/slide9.xml><?xml version="1.0" encoding="utf-8"?>
 <p:sld xmlns:a="http://schemas.openxmlformats.org/drawingml/2006/main" xmlns:r="http://schemas.openxmlformats.org/officeDocument/2006/relationships" xmlns:p="http://schemas.openxmlformats.org/presentationml/2006/main">
   <p:cSld>
     <p:spTree>

</xml_diff>

<commit_message>
- add fun stopScanLocation if user turn off location in fragment AttendanceFragment.kt
</commit_message>
<xml_diff>
--- a/dokumen/ppt_csd40.pptx
+++ b/dokumen/ppt_csd40.pptx
@@ -3458,7 +3458,7 @@
         </p:blipFill>
         <p:spPr>
           <a:xfrm>
-            <a:off x="6095998" y="2061435"/>
+            <a:off x="6096000" y="1959806"/>
             <a:ext cx="1710921" cy="911710"/>
           </a:xfrm>
           <a:prstGeom prst="rect">
@@ -3497,7 +3497,7 @@
         </p:blipFill>
         <p:spPr>
           <a:xfrm>
-            <a:off x="4811085" y="2061435"/>
+            <a:off x="4811087" y="1959806"/>
             <a:ext cx="1284913" cy="911710"/>
           </a:xfrm>
           <a:prstGeom prst="rect">
@@ -7163,8 +7163,8 @@
         </p:blipFill>
         <p:spPr>
           <a:xfrm>
-            <a:off x="9875219" y="5480388"/>
-            <a:ext cx="1710921" cy="911710"/>
+            <a:off x="10583446" y="5857786"/>
+            <a:ext cx="1002694" cy="534312"/>
           </a:xfrm>
           <a:prstGeom prst="rect">
             <a:avLst/>
@@ -7202,8 +7202,8 @@
         </p:blipFill>
         <p:spPr>
           <a:xfrm>
-            <a:off x="8434835" y="5480388"/>
-            <a:ext cx="1284913" cy="911710"/>
+            <a:off x="9830416" y="5857786"/>
+            <a:ext cx="753030" cy="534312"/>
           </a:xfrm>
           <a:prstGeom prst="rect">
             <a:avLst/>
@@ -7729,10 +7729,10 @@
       </p:grpSpPr>
       <p:pic>
         <p:nvPicPr>
-          <p:cNvPr id="3" name="Picture 2">
-            <a:extLst>
-              <a:ext uri="{FF2B5EF4-FFF2-40B4-BE49-F238E27FC236}">
-                <a16:creationId xmlns:a16="http://schemas.microsoft.com/office/drawing/2014/main" id="{86AEE542-B8F8-4488-B683-B6C0D56F50C8}"/>
+          <p:cNvPr id="5" name="Picture 4">
+            <a:extLst>
+              <a:ext uri="{FF2B5EF4-FFF2-40B4-BE49-F238E27FC236}">
+                <a16:creationId xmlns:a16="http://schemas.microsoft.com/office/drawing/2014/main" id="{A11CFA7D-2071-4BE7-9AF2-4CD84AF4D660}"/>
               </a:ext>
             </a:extLst>
           </p:cNvPr>
@@ -7747,83 +7747,8 @@
               <a:ext uri="{28A0092B-C50C-407E-A947-70E740481C1C}">
                 <a14:useLocalDpi xmlns:a14="http://schemas.microsoft.com/office/drawing/2010/main" val="0"/>
               </a:ext>
-            </a:extLst>
-          </a:blip>
-          <a:stretch>
-            <a:fillRect/>
-          </a:stretch>
-        </p:blipFill>
-        <p:spPr>
-          <a:xfrm>
-            <a:off x="9875219" y="5480388"/>
-            <a:ext cx="1710921" cy="911710"/>
-          </a:xfrm>
-          <a:prstGeom prst="rect">
-            <a:avLst/>
-          </a:prstGeom>
-        </p:spPr>
-      </p:pic>
-      <p:pic>
-        <p:nvPicPr>
-          <p:cNvPr id="6" name="Picture 5">
-            <a:extLst>
-              <a:ext uri="{FF2B5EF4-FFF2-40B4-BE49-F238E27FC236}">
-                <a16:creationId xmlns:a16="http://schemas.microsoft.com/office/drawing/2014/main" id="{4D7AE8FB-09C1-478A-90F5-6799D028810C}"/>
-              </a:ext>
-            </a:extLst>
-          </p:cNvPr>
-          <p:cNvPicPr>
-            <a:picLocks noChangeAspect="1"/>
-          </p:cNvPicPr>
-          <p:nvPr/>
-        </p:nvPicPr>
-        <p:blipFill>
-          <a:blip r:embed="rId3">
-            <a:extLst>
-              <a:ext uri="{28A0092B-C50C-407E-A947-70E740481C1C}">
-                <a14:useLocalDpi xmlns:a14="http://schemas.microsoft.com/office/drawing/2010/main" val="0"/>
-              </a:ext>
               <a:ext uri="{837473B0-CC2E-450A-ABE3-18F120FF3D39}">
-                <a1611:picAttrSrcUrl xmlns:a1611="http://schemas.microsoft.com/office/drawing/2016/11/main" r:id="rId4"/>
-              </a:ext>
-            </a:extLst>
-          </a:blip>
-          <a:stretch>
-            <a:fillRect/>
-          </a:stretch>
-        </p:blipFill>
-        <p:spPr>
-          <a:xfrm>
-            <a:off x="8434835" y="5480388"/>
-            <a:ext cx="1284913" cy="911710"/>
-          </a:xfrm>
-          <a:prstGeom prst="rect">
-            <a:avLst/>
-          </a:prstGeom>
-        </p:spPr>
-      </p:pic>
-      <p:pic>
-        <p:nvPicPr>
-          <p:cNvPr id="5" name="Picture 4">
-            <a:extLst>
-              <a:ext uri="{FF2B5EF4-FFF2-40B4-BE49-F238E27FC236}">
-                <a16:creationId xmlns:a16="http://schemas.microsoft.com/office/drawing/2014/main" id="{A11CFA7D-2071-4BE7-9AF2-4CD84AF4D660}"/>
-              </a:ext>
-            </a:extLst>
-          </p:cNvPr>
-          <p:cNvPicPr>
-            <a:picLocks noChangeAspect="1"/>
-          </p:cNvPicPr>
-          <p:nvPr/>
-        </p:nvPicPr>
-        <p:blipFill>
-          <a:blip r:embed="rId5">
-            <a:extLst>
-              <a:ext uri="{28A0092B-C50C-407E-A947-70E740481C1C}">
-                <a14:useLocalDpi xmlns:a14="http://schemas.microsoft.com/office/drawing/2010/main" val="0"/>
-              </a:ext>
-              <a:ext uri="{837473B0-CC2E-450A-ABE3-18F120FF3D39}">
-                <a1611:picAttrSrcUrl xmlns:a1611="http://schemas.microsoft.com/office/drawing/2016/11/main" r:id="rId6"/>
+                <a1611:picAttrSrcUrl xmlns:a1611="http://schemas.microsoft.com/office/drawing/2016/11/main" r:id="rId3"/>
               </a:ext>
             </a:extLst>
           </a:blip>
@@ -8324,6 +8249,81 @@
           </a:p>
         </p:txBody>
       </p:sp>
+      <p:pic>
+        <p:nvPicPr>
+          <p:cNvPr id="7" name="Picture 6">
+            <a:extLst>
+              <a:ext uri="{FF2B5EF4-FFF2-40B4-BE49-F238E27FC236}">
+                <a16:creationId xmlns:a16="http://schemas.microsoft.com/office/drawing/2014/main" id="{E6020FD1-0211-48D2-9CA0-2C1DF83FD4D0}"/>
+              </a:ext>
+            </a:extLst>
+          </p:cNvPr>
+          <p:cNvPicPr>
+            <a:picLocks noChangeAspect="1"/>
+          </p:cNvPicPr>
+          <p:nvPr/>
+        </p:nvPicPr>
+        <p:blipFill>
+          <a:blip r:embed="rId4">
+            <a:extLst>
+              <a:ext uri="{28A0092B-C50C-407E-A947-70E740481C1C}">
+                <a14:useLocalDpi xmlns:a14="http://schemas.microsoft.com/office/drawing/2010/main" val="0"/>
+              </a:ext>
+            </a:extLst>
+          </a:blip>
+          <a:stretch>
+            <a:fillRect/>
+          </a:stretch>
+        </p:blipFill>
+        <p:spPr>
+          <a:xfrm>
+            <a:off x="10583446" y="5857786"/>
+            <a:ext cx="1002694" cy="534312"/>
+          </a:xfrm>
+          <a:prstGeom prst="rect">
+            <a:avLst/>
+          </a:prstGeom>
+        </p:spPr>
+      </p:pic>
+      <p:pic>
+        <p:nvPicPr>
+          <p:cNvPr id="8" name="Picture 7">
+            <a:extLst>
+              <a:ext uri="{FF2B5EF4-FFF2-40B4-BE49-F238E27FC236}">
+                <a16:creationId xmlns:a16="http://schemas.microsoft.com/office/drawing/2014/main" id="{3F9A6148-FDD1-4E74-B86F-38D3E0D86928}"/>
+              </a:ext>
+            </a:extLst>
+          </p:cNvPr>
+          <p:cNvPicPr>
+            <a:picLocks noChangeAspect="1"/>
+          </p:cNvPicPr>
+          <p:nvPr/>
+        </p:nvPicPr>
+        <p:blipFill>
+          <a:blip r:embed="rId5">
+            <a:extLst>
+              <a:ext uri="{28A0092B-C50C-407E-A947-70E740481C1C}">
+                <a14:useLocalDpi xmlns:a14="http://schemas.microsoft.com/office/drawing/2010/main" val="0"/>
+              </a:ext>
+              <a:ext uri="{837473B0-CC2E-450A-ABE3-18F120FF3D39}">
+                <a1611:picAttrSrcUrl xmlns:a1611="http://schemas.microsoft.com/office/drawing/2016/11/main" r:id="rId6"/>
+              </a:ext>
+            </a:extLst>
+          </a:blip>
+          <a:stretch>
+            <a:fillRect/>
+          </a:stretch>
+        </p:blipFill>
+        <p:spPr>
+          <a:xfrm>
+            <a:off x="9830416" y="5857786"/>
+            <a:ext cx="753030" cy="534312"/>
+          </a:xfrm>
+          <a:prstGeom prst="rect">
+            <a:avLst/>
+          </a:prstGeom>
+        </p:spPr>
+      </p:pic>
     </p:spTree>
     <p:extLst>
       <p:ext uri="{BB962C8B-B14F-4D97-AF65-F5344CB8AC3E}">
@@ -8454,10 +8454,10 @@
       </p:grpSpPr>
       <p:pic>
         <p:nvPicPr>
-          <p:cNvPr id="3" name="Picture 2">
-            <a:extLst>
-              <a:ext uri="{FF2B5EF4-FFF2-40B4-BE49-F238E27FC236}">
-                <a16:creationId xmlns:a16="http://schemas.microsoft.com/office/drawing/2014/main" id="{86AEE542-B8F8-4488-B683-B6C0D56F50C8}"/>
+          <p:cNvPr id="5" name="Picture 4">
+            <a:extLst>
+              <a:ext uri="{FF2B5EF4-FFF2-40B4-BE49-F238E27FC236}">
+                <a16:creationId xmlns:a16="http://schemas.microsoft.com/office/drawing/2014/main" id="{A11CFA7D-2071-4BE7-9AF2-4CD84AF4D660}"/>
               </a:ext>
             </a:extLst>
           </p:cNvPr>
@@ -8472,6 +8472,9 @@
               <a:ext uri="{28A0092B-C50C-407E-A947-70E740481C1C}">
                 <a14:useLocalDpi xmlns:a14="http://schemas.microsoft.com/office/drawing/2010/main" val="0"/>
               </a:ext>
+              <a:ext uri="{837473B0-CC2E-450A-ABE3-18F120FF3D39}">
+                <a1611:picAttrSrcUrl xmlns:a1611="http://schemas.microsoft.com/office/drawing/2016/11/main" r:id="rId3"/>
+              </a:ext>
             </a:extLst>
           </a:blip>
           <a:stretch>
@@ -8480,8 +8483,8 @@
         </p:blipFill>
         <p:spPr>
           <a:xfrm>
-            <a:off x="9875219" y="5480388"/>
-            <a:ext cx="1710921" cy="911710"/>
+            <a:off x="609600" y="-415212"/>
+            <a:ext cx="2743200" cy="2743200"/>
           </a:xfrm>
           <a:prstGeom prst="rect">
             <a:avLst/>
@@ -8490,10 +8493,10 @@
       </p:pic>
       <p:pic>
         <p:nvPicPr>
-          <p:cNvPr id="6" name="Picture 5">
-            <a:extLst>
-              <a:ext uri="{FF2B5EF4-FFF2-40B4-BE49-F238E27FC236}">
-                <a16:creationId xmlns:a16="http://schemas.microsoft.com/office/drawing/2014/main" id="{4D7AE8FB-09C1-478A-90F5-6799D028810C}"/>
+          <p:cNvPr id="4" name="Picture 3">
+            <a:extLst>
+              <a:ext uri="{FF2B5EF4-FFF2-40B4-BE49-F238E27FC236}">
+                <a16:creationId xmlns:a16="http://schemas.microsoft.com/office/drawing/2014/main" id="{FE8DB86E-D182-4423-B517-D08B0D9FD792}"/>
               </a:ext>
             </a:extLst>
           </p:cNvPr>
@@ -8503,13 +8506,10 @@
           <p:nvPr/>
         </p:nvPicPr>
         <p:blipFill>
-          <a:blip r:embed="rId3">
+          <a:blip r:embed="rId4">
             <a:extLst>
               <a:ext uri="{28A0092B-C50C-407E-A947-70E740481C1C}">
                 <a14:useLocalDpi xmlns:a14="http://schemas.microsoft.com/office/drawing/2010/main" val="0"/>
-              </a:ext>
-              <a:ext uri="{837473B0-CC2E-450A-ABE3-18F120FF3D39}">
-                <a1611:picAttrSrcUrl xmlns:a1611="http://schemas.microsoft.com/office/drawing/2016/11/main" r:id="rId4"/>
               </a:ext>
             </a:extLst>
           </a:blip>
@@ -8519,8 +8519,8 @@
         </p:blipFill>
         <p:spPr>
           <a:xfrm>
-            <a:off x="8434835" y="5480388"/>
-            <a:ext cx="1284913" cy="911710"/>
+            <a:off x="2634523" y="1510720"/>
+            <a:ext cx="6922954" cy="3836559"/>
           </a:xfrm>
           <a:prstGeom prst="rect">
             <a:avLst/>
@@ -8529,10 +8529,10 @@
       </p:pic>
       <p:pic>
         <p:nvPicPr>
-          <p:cNvPr id="5" name="Picture 4">
-            <a:extLst>
-              <a:ext uri="{FF2B5EF4-FFF2-40B4-BE49-F238E27FC236}">
-                <a16:creationId xmlns:a16="http://schemas.microsoft.com/office/drawing/2014/main" id="{A11CFA7D-2071-4BE7-9AF2-4CD84AF4D660}"/>
+          <p:cNvPr id="7" name="Picture 6">
+            <a:extLst>
+              <a:ext uri="{FF2B5EF4-FFF2-40B4-BE49-F238E27FC236}">
+                <a16:creationId xmlns:a16="http://schemas.microsoft.com/office/drawing/2014/main" id="{07F20F2B-A182-4EBC-BA79-AE0D2EE8FE22}"/>
               </a:ext>
             </a:extLst>
           </p:cNvPr>
@@ -8547,9 +8547,6 @@
               <a:ext uri="{28A0092B-C50C-407E-A947-70E740481C1C}">
                 <a14:useLocalDpi xmlns:a14="http://schemas.microsoft.com/office/drawing/2010/main" val="0"/>
               </a:ext>
-              <a:ext uri="{837473B0-CC2E-450A-ABE3-18F120FF3D39}">
-                <a1611:picAttrSrcUrl xmlns:a1611="http://schemas.microsoft.com/office/drawing/2016/11/main" r:id="rId6"/>
-              </a:ext>
             </a:extLst>
           </a:blip>
           <a:stretch>
@@ -8558,8 +8555,8 @@
         </p:blipFill>
         <p:spPr>
           <a:xfrm>
-            <a:off x="609600" y="-415212"/>
-            <a:ext cx="2743200" cy="2743200"/>
+            <a:off x="10583446" y="5857786"/>
+            <a:ext cx="1002694" cy="534312"/>
           </a:xfrm>
           <a:prstGeom prst="rect">
             <a:avLst/>
@@ -8568,10 +8565,10 @@
       </p:pic>
       <p:pic>
         <p:nvPicPr>
-          <p:cNvPr id="4" name="Picture 3">
-            <a:extLst>
-              <a:ext uri="{FF2B5EF4-FFF2-40B4-BE49-F238E27FC236}">
-                <a16:creationId xmlns:a16="http://schemas.microsoft.com/office/drawing/2014/main" id="{FE8DB86E-D182-4423-B517-D08B0D9FD792}"/>
+          <p:cNvPr id="8" name="Picture 7">
+            <a:extLst>
+              <a:ext uri="{FF2B5EF4-FFF2-40B4-BE49-F238E27FC236}">
+                <a16:creationId xmlns:a16="http://schemas.microsoft.com/office/drawing/2014/main" id="{A1C84A1A-9EB7-493E-9BD2-2635054DB33A}"/>
               </a:ext>
             </a:extLst>
           </p:cNvPr>
@@ -8581,10 +8578,13 @@
           <p:nvPr/>
         </p:nvPicPr>
         <p:blipFill>
-          <a:blip r:embed="rId7">
+          <a:blip r:embed="rId6">
             <a:extLst>
               <a:ext uri="{28A0092B-C50C-407E-A947-70E740481C1C}">
                 <a14:useLocalDpi xmlns:a14="http://schemas.microsoft.com/office/drawing/2010/main" val="0"/>
+              </a:ext>
+              <a:ext uri="{837473B0-CC2E-450A-ABE3-18F120FF3D39}">
+                <a1611:picAttrSrcUrl xmlns:a1611="http://schemas.microsoft.com/office/drawing/2016/11/main" r:id="rId7"/>
               </a:ext>
             </a:extLst>
           </a:blip>
@@ -8594,8 +8594,8 @@
         </p:blipFill>
         <p:spPr>
           <a:xfrm>
-            <a:off x="2634523" y="1510720"/>
-            <a:ext cx="6922954" cy="3836559"/>
+            <a:off x="9830416" y="5857786"/>
+            <a:ext cx="753030" cy="534312"/>
           </a:xfrm>
           <a:prstGeom prst="rect">
             <a:avLst/>
@@ -8846,10 +8846,10 @@
       </p:sp>
       <p:pic>
         <p:nvPicPr>
-          <p:cNvPr id="3" name="Picture 2">
-            <a:extLst>
-              <a:ext uri="{FF2B5EF4-FFF2-40B4-BE49-F238E27FC236}">
-                <a16:creationId xmlns:a16="http://schemas.microsoft.com/office/drawing/2014/main" id="{86AEE542-B8F8-4488-B683-B6C0D56F50C8}"/>
+          <p:cNvPr id="5" name="Picture 4">
+            <a:extLst>
+              <a:ext uri="{FF2B5EF4-FFF2-40B4-BE49-F238E27FC236}">
+                <a16:creationId xmlns:a16="http://schemas.microsoft.com/office/drawing/2014/main" id="{EAD2AF43-BD00-422B-B27F-DE684948877A}"/>
               </a:ext>
             </a:extLst>
           </p:cNvPr>
@@ -8872,8 +8872,8 @@
         </p:blipFill>
         <p:spPr>
           <a:xfrm>
-            <a:off x="9875219" y="5480388"/>
-            <a:ext cx="1710921" cy="911710"/>
+            <a:off x="10583446" y="5857786"/>
+            <a:ext cx="1002694" cy="534312"/>
           </a:xfrm>
           <a:prstGeom prst="rect">
             <a:avLst/>
@@ -8882,10 +8882,10 @@
       </p:pic>
       <p:pic>
         <p:nvPicPr>
-          <p:cNvPr id="6" name="Picture 5">
-            <a:extLst>
-              <a:ext uri="{FF2B5EF4-FFF2-40B4-BE49-F238E27FC236}">
-                <a16:creationId xmlns:a16="http://schemas.microsoft.com/office/drawing/2014/main" id="{4D7AE8FB-09C1-478A-90F5-6799D028810C}"/>
+          <p:cNvPr id="7" name="Picture 6">
+            <a:extLst>
+              <a:ext uri="{FF2B5EF4-FFF2-40B4-BE49-F238E27FC236}">
+                <a16:creationId xmlns:a16="http://schemas.microsoft.com/office/drawing/2014/main" id="{0DC8D6BD-927B-4253-A63C-F6DFF7AF3FB4}"/>
               </a:ext>
             </a:extLst>
           </p:cNvPr>
@@ -8911,8 +8911,8 @@
         </p:blipFill>
         <p:spPr>
           <a:xfrm>
-            <a:off x="8434835" y="5480388"/>
-            <a:ext cx="1284913" cy="911710"/>
+            <a:off x="9830416" y="5857786"/>
+            <a:ext cx="753030" cy="534312"/>
           </a:xfrm>
           <a:prstGeom prst="rect">
             <a:avLst/>

</xml_diff>